<commit_message>
Replace Aider with Cline
</commit_message>
<xml_diff>
--- a/docs/docs-src/wordslab-notebooks-architecture.pptx
+++ b/docs/docs-src/wordslab-notebooks-architecture.pptx
@@ -913,7 +913,7 @@
           <a:p>
             <a:fld id="{5D1AF5DF-F9CE-48E9-9B08-50E65CE8DFD8}" type="datetimeFigureOut">
               <a:rPr lang="fr-FR" smtClean="0"/>
-              <a:t>21/04/2025</a:t>
+              <a:t>10/12/2025</a:t>
             </a:fld>
             <a:endParaRPr lang="fr-FR"/>
           </a:p>
@@ -1327,7 +1327,7 @@
           <a:p>
             <a:fld id="{4290C79D-B00B-41B5-A9A4-6F9BDD351292}" type="datetimeFigureOut">
               <a:rPr lang="fr-FR" smtClean="0"/>
-              <a:t>21/04/2025</a:t>
+              <a:t>10/12/2025</a:t>
             </a:fld>
             <a:endParaRPr lang="fr-FR"/>
           </a:p>
@@ -1525,7 +1525,7 @@
           <a:p>
             <a:fld id="{4290C79D-B00B-41B5-A9A4-6F9BDD351292}" type="datetimeFigureOut">
               <a:rPr lang="fr-FR" smtClean="0"/>
-              <a:t>21/04/2025</a:t>
+              <a:t>10/12/2025</a:t>
             </a:fld>
             <a:endParaRPr lang="fr-FR"/>
           </a:p>
@@ -1733,7 +1733,7 @@
           <a:p>
             <a:fld id="{4290C79D-B00B-41B5-A9A4-6F9BDD351292}" type="datetimeFigureOut">
               <a:rPr lang="fr-FR" smtClean="0"/>
-              <a:t>21/04/2025</a:t>
+              <a:t>10/12/2025</a:t>
             </a:fld>
             <a:endParaRPr lang="fr-FR"/>
           </a:p>
@@ -1931,7 +1931,7 @@
           <a:p>
             <a:fld id="{4290C79D-B00B-41B5-A9A4-6F9BDD351292}" type="datetimeFigureOut">
               <a:rPr lang="fr-FR" smtClean="0"/>
-              <a:t>21/04/2025</a:t>
+              <a:t>10/12/2025</a:t>
             </a:fld>
             <a:endParaRPr lang="fr-FR"/>
           </a:p>
@@ -2206,7 +2206,7 @@
           <a:p>
             <a:fld id="{4290C79D-B00B-41B5-A9A4-6F9BDD351292}" type="datetimeFigureOut">
               <a:rPr lang="fr-FR" smtClean="0"/>
-              <a:t>21/04/2025</a:t>
+              <a:t>10/12/2025</a:t>
             </a:fld>
             <a:endParaRPr lang="fr-FR"/>
           </a:p>
@@ -2471,7 +2471,7 @@
           <a:p>
             <a:fld id="{4290C79D-B00B-41B5-A9A4-6F9BDD351292}" type="datetimeFigureOut">
               <a:rPr lang="fr-FR" smtClean="0"/>
-              <a:t>21/04/2025</a:t>
+              <a:t>10/12/2025</a:t>
             </a:fld>
             <a:endParaRPr lang="fr-FR"/>
           </a:p>
@@ -2883,7 +2883,7 @@
           <a:p>
             <a:fld id="{4290C79D-B00B-41B5-A9A4-6F9BDD351292}" type="datetimeFigureOut">
               <a:rPr lang="fr-FR" smtClean="0"/>
-              <a:t>21/04/2025</a:t>
+              <a:t>10/12/2025</a:t>
             </a:fld>
             <a:endParaRPr lang="fr-FR"/>
           </a:p>
@@ -3024,7 +3024,7 @@
           <a:p>
             <a:fld id="{4290C79D-B00B-41B5-A9A4-6F9BDD351292}" type="datetimeFigureOut">
               <a:rPr lang="fr-FR" smtClean="0"/>
-              <a:t>21/04/2025</a:t>
+              <a:t>10/12/2025</a:t>
             </a:fld>
             <a:endParaRPr lang="fr-FR"/>
           </a:p>
@@ -3137,7 +3137,7 @@
           <a:p>
             <a:fld id="{4290C79D-B00B-41B5-A9A4-6F9BDD351292}" type="datetimeFigureOut">
               <a:rPr lang="fr-FR" smtClean="0"/>
-              <a:t>21/04/2025</a:t>
+              <a:t>10/12/2025</a:t>
             </a:fld>
             <a:endParaRPr lang="fr-FR"/>
           </a:p>
@@ -3448,7 +3448,7 @@
           <a:p>
             <a:fld id="{4290C79D-B00B-41B5-A9A4-6F9BDD351292}" type="datetimeFigureOut">
               <a:rPr lang="fr-FR" smtClean="0"/>
-              <a:t>21/04/2025</a:t>
+              <a:t>10/12/2025</a:t>
             </a:fld>
             <a:endParaRPr lang="fr-FR"/>
           </a:p>
@@ -3736,7 +3736,7 @@
           <a:p>
             <a:fld id="{4290C79D-B00B-41B5-A9A4-6F9BDD351292}" type="datetimeFigureOut">
               <a:rPr lang="fr-FR" smtClean="0"/>
-              <a:t>21/04/2025</a:t>
+              <a:t>10/12/2025</a:t>
             </a:fld>
             <a:endParaRPr lang="fr-FR"/>
           </a:p>
@@ -3977,7 +3977,7 @@
           <a:p>
             <a:fld id="{4290C79D-B00B-41B5-A9A4-6F9BDD351292}" type="datetimeFigureOut">
               <a:rPr lang="fr-FR" smtClean="0"/>
-              <a:t>21/04/2025</a:t>
+              <a:t>10/12/2025</a:t>
             </a:fld>
             <a:endParaRPr lang="fr-FR"/>
           </a:p>
@@ -6163,7 +6163,7 @@
                   <a:schemeClr val="tx1"/>
                 </a:solidFill>
               </a:rPr>
-              <a:t> Continue and Aider AI assistants</a:t>
+              <a:t> Continue and Cline AI assistants</a:t>
             </a:r>
             <a:endParaRPr lang="fr-FR" sz="1100" dirty="0">
               <a:solidFill>
@@ -7111,10 +7111,10 @@
       </p:sp>
       <p:pic>
         <p:nvPicPr>
-          <p:cNvPr id="27" name="Image 26">
-            <a:extLst>
-              <a:ext uri="{FF2B5EF4-FFF2-40B4-BE49-F238E27FC236}">
-                <a16:creationId xmlns:a16="http://schemas.microsoft.com/office/drawing/2014/main" id="{17530678-7ED4-6982-2E3C-F77B76BF4E8B}"/>
+          <p:cNvPr id="32" name="Image 31">
+            <a:extLst>
+              <a:ext uri="{FF2B5EF4-FFF2-40B4-BE49-F238E27FC236}">
+                <a16:creationId xmlns:a16="http://schemas.microsoft.com/office/drawing/2014/main" id="{46E7E616-4F2D-F456-0D58-3A0B9D581A9F}"/>
               </a:ext>
             </a:extLst>
           </p:cNvPr>
@@ -7131,8 +7131,8 @@
         </p:blipFill>
         <p:spPr>
           <a:xfrm>
-            <a:off x="10155149" y="1971806"/>
-            <a:ext cx="1193815" cy="504847"/>
+            <a:off x="483861" y="2785354"/>
+            <a:ext cx="3497292" cy="3059776"/>
           </a:xfrm>
           <a:prstGeom prst="rect">
             <a:avLst/>
@@ -7141,10 +7141,10 @@
       </p:pic>
       <p:pic>
         <p:nvPicPr>
-          <p:cNvPr id="32" name="Image 31">
-            <a:extLst>
-              <a:ext uri="{FF2B5EF4-FFF2-40B4-BE49-F238E27FC236}">
-                <a16:creationId xmlns:a16="http://schemas.microsoft.com/office/drawing/2014/main" id="{46E7E616-4F2D-F456-0D58-3A0B9D581A9F}"/>
+          <p:cNvPr id="34" name="Image 33">
+            <a:extLst>
+              <a:ext uri="{FF2B5EF4-FFF2-40B4-BE49-F238E27FC236}">
+                <a16:creationId xmlns:a16="http://schemas.microsoft.com/office/drawing/2014/main" id="{F2DF9DAD-48C1-D76D-C410-C2EFEC9FF724}"/>
               </a:ext>
             </a:extLst>
           </p:cNvPr>
@@ -7161,8 +7161,8 @@
         </p:blipFill>
         <p:spPr>
           <a:xfrm>
-            <a:off x="483861" y="2785354"/>
-            <a:ext cx="3497292" cy="3059776"/>
+            <a:off x="4348808" y="2782155"/>
+            <a:ext cx="3498549" cy="3062975"/>
           </a:xfrm>
           <a:prstGeom prst="rect">
             <a:avLst/>
@@ -7171,10 +7171,10 @@
       </p:pic>
       <p:pic>
         <p:nvPicPr>
-          <p:cNvPr id="34" name="Image 33">
-            <a:extLst>
-              <a:ext uri="{FF2B5EF4-FFF2-40B4-BE49-F238E27FC236}">
-                <a16:creationId xmlns:a16="http://schemas.microsoft.com/office/drawing/2014/main" id="{F2DF9DAD-48C1-D76D-C410-C2EFEC9FF724}"/>
+          <p:cNvPr id="36" name="Image 35">
+            <a:extLst>
+              <a:ext uri="{FF2B5EF4-FFF2-40B4-BE49-F238E27FC236}">
+                <a16:creationId xmlns:a16="http://schemas.microsoft.com/office/drawing/2014/main" id="{1E5BB9BC-05B6-ED7E-4F46-9956A3E989F5}"/>
               </a:ext>
             </a:extLst>
           </p:cNvPr>
@@ -7191,8 +7191,8 @@
         </p:blipFill>
         <p:spPr>
           <a:xfrm>
-            <a:off x="4348808" y="2782155"/>
-            <a:ext cx="3498549" cy="3062975"/>
+            <a:off x="8202048" y="2789258"/>
+            <a:ext cx="3473721" cy="3055871"/>
           </a:xfrm>
           <a:prstGeom prst="rect">
             <a:avLst/>
@@ -7201,10 +7201,10 @@
       </p:pic>
       <p:pic>
         <p:nvPicPr>
-          <p:cNvPr id="36" name="Image 35">
-            <a:extLst>
-              <a:ext uri="{FF2B5EF4-FFF2-40B4-BE49-F238E27FC236}">
-                <a16:creationId xmlns:a16="http://schemas.microsoft.com/office/drawing/2014/main" id="{1E5BB9BC-05B6-ED7E-4F46-9956A3E989F5}"/>
+          <p:cNvPr id="3" name="Image 2" descr="Une image contenant logo, Police, Graphique, blanc&#10;&#10;Le contenu généré par l’IA peut être incorrect.">
+            <a:extLst>
+              <a:ext uri="{FF2B5EF4-FFF2-40B4-BE49-F238E27FC236}">
+                <a16:creationId xmlns:a16="http://schemas.microsoft.com/office/drawing/2014/main" id="{D8D59F01-F16D-C034-163F-95C41BB1CC97}"/>
               </a:ext>
             </a:extLst>
           </p:cNvPr>
@@ -7221,8 +7221,8 @@
         </p:blipFill>
         <p:spPr>
           <a:xfrm>
-            <a:off x="8202048" y="2789258"/>
-            <a:ext cx="3473721" cy="3055871"/>
+            <a:off x="10098406" y="1949905"/>
+            <a:ext cx="1269641" cy="542939"/>
           </a:xfrm>
           <a:prstGeom prst="rect">
             <a:avLst/>

</xml_diff>